<commit_message>
Ejemplo de manejo de formularios
</commit_message>
<xml_diff>
--- a/HP Formularios.pptx
+++ b/HP Formularios.pptx
@@ -11,9 +11,10 @@
     <p:sldId id="261" r:id="rId5"/>
     <p:sldId id="262" r:id="rId6"/>
     <p:sldId id="263" r:id="rId7"/>
-    <p:sldId id="264" r:id="rId8"/>
-    <p:sldId id="265" r:id="rId9"/>
-    <p:sldId id="266" r:id="rId10"/>
+    <p:sldId id="267" r:id="rId8"/>
+    <p:sldId id="264" r:id="rId9"/>
+    <p:sldId id="265" r:id="rId10"/>
+    <p:sldId id="266" r:id="rId11"/>
   </p:sldIdLst>
   <p:sldSz cx="12192000" cy="6858000"/>
   <p:notesSz cx="6858000" cy="9144000"/>
@@ -112,6 +113,11 @@
       </a:defRPr>
     </a:lvl9pPr>
   </p:defaultTextStyle>
+  <p:extLst>
+    <p:ext uri="{EFAFB233-063F-42B5-8137-9DF3F51BA10A}">
+      <p15:sldGuideLst xmlns:p15="http://schemas.microsoft.com/office/powerpoint/2012/main"/>
+    </p:ext>
+  </p:extLst>
 </p:presentation>
 </file>
 
@@ -165,7 +171,7 @@
           <a:noFill/>
           <a:extLst>
             <a:ext uri="{909E8E84-426E-40dd-AFC4-6F175D3DCCD1}">
-              <a14:hiddenFill xmlns:a14="http://schemas.microsoft.com/office/drawing/2010/main" xmlns="">
+              <a14:hiddenFill xmlns="" xmlns:a14="http://schemas.microsoft.com/office/drawing/2010/main">
                 <a:solidFill>
                   <a:srgbClr val="FFFFFF"/>
                 </a:solidFill>
@@ -225,7 +231,7 @@
             </a:ln>
             <a:extLst>
               <a:ext uri="{91240B29-F687-4f45-9708-019B960494DF}">
-                <a14:hiddenLine xmlns:a14="http://schemas.microsoft.com/office/drawing/2010/main" xmlns="" w="9525">
+                <a14:hiddenLine xmlns="" xmlns:a14="http://schemas.microsoft.com/office/drawing/2010/main" w="9525">
                   <a:solidFill>
                     <a:srgbClr val="000000"/>
                   </a:solidFill>
@@ -315,7 +321,7 @@
             </a:ln>
             <a:extLst>
               <a:ext uri="{91240B29-F687-4f45-9708-019B960494DF}">
-                <a14:hiddenLine xmlns:a14="http://schemas.microsoft.com/office/drawing/2010/main" xmlns="" w="9525">
+                <a14:hiddenLine xmlns="" xmlns:a14="http://schemas.microsoft.com/office/drawing/2010/main" w="9525">
                   <a:solidFill>
                     <a:srgbClr val="000000"/>
                   </a:solidFill>
@@ -405,7 +411,7 @@
             </a:ln>
             <a:extLst>
               <a:ext uri="{91240B29-F687-4f45-9708-019B960494DF}">
-                <a14:hiddenLine xmlns:a14="http://schemas.microsoft.com/office/drawing/2010/main" xmlns="" w="9525">
+                <a14:hiddenLine xmlns="" xmlns:a14="http://schemas.microsoft.com/office/drawing/2010/main" w="9525">
                   <a:solidFill>
                     <a:srgbClr val="000000"/>
                   </a:solidFill>
@@ -439,7 +445,7 @@
             </a:ln>
             <a:extLst>
               <a:ext uri="{91240B29-F687-4f45-9708-019B960494DF}">
-                <a14:hiddenLine xmlns:a14="http://schemas.microsoft.com/office/drawing/2010/main" xmlns="" w="9525">
+                <a14:hiddenLine xmlns="" xmlns:a14="http://schemas.microsoft.com/office/drawing/2010/main" w="9525">
                   <a:solidFill>
                     <a:srgbClr val="000000"/>
                   </a:solidFill>
@@ -529,7 +535,7 @@
             </a:ln>
             <a:extLst>
               <a:ext uri="{91240B29-F687-4f45-9708-019B960494DF}">
-                <a14:hiddenLine xmlns:a14="http://schemas.microsoft.com/office/drawing/2010/main" xmlns="" w="9525">
+                <a14:hiddenLine xmlns="" xmlns:a14="http://schemas.microsoft.com/office/drawing/2010/main" w="9525">
                   <a:solidFill>
                     <a:srgbClr val="000000"/>
                   </a:solidFill>
@@ -591,7 +597,7 @@
             </a:ln>
             <a:extLst>
               <a:ext uri="{91240B29-F687-4f45-9708-019B960494DF}">
-                <a14:hiddenLine xmlns:a14="http://schemas.microsoft.com/office/drawing/2010/main" xmlns="" w="9525">
+                <a14:hiddenLine xmlns="" xmlns:a14="http://schemas.microsoft.com/office/drawing/2010/main" w="9525">
                   <a:solidFill>
                     <a:srgbClr val="000000"/>
                   </a:solidFill>
@@ -653,7 +659,7 @@
             </a:ln>
             <a:extLst>
               <a:ext uri="{91240B29-F687-4f45-9708-019B960494DF}">
-                <a14:hiddenLine xmlns:a14="http://schemas.microsoft.com/office/drawing/2010/main" xmlns="" w="9525">
+                <a14:hiddenLine xmlns="" xmlns:a14="http://schemas.microsoft.com/office/drawing/2010/main" w="9525">
                   <a:solidFill>
                     <a:srgbClr val="000000"/>
                   </a:solidFill>
@@ -743,7 +749,7 @@
             </a:ln>
             <a:extLst>
               <a:ext uri="{91240B29-F687-4f45-9708-019B960494DF}">
-                <a14:hiddenLine xmlns:a14="http://schemas.microsoft.com/office/drawing/2010/main" xmlns="" w="9525">
+                <a14:hiddenLine xmlns="" xmlns:a14="http://schemas.microsoft.com/office/drawing/2010/main" w="9525">
                   <a:solidFill>
                     <a:srgbClr val="000000"/>
                   </a:solidFill>
@@ -805,7 +811,7 @@
             </a:ln>
             <a:extLst>
               <a:ext uri="{91240B29-F687-4f45-9708-019B960494DF}">
-                <a14:hiddenLine xmlns:a14="http://schemas.microsoft.com/office/drawing/2010/main" xmlns="" w="9525">
+                <a14:hiddenLine xmlns="" xmlns:a14="http://schemas.microsoft.com/office/drawing/2010/main" w="9525">
                   <a:solidFill>
                     <a:srgbClr val="000000"/>
                   </a:solidFill>
@@ -867,7 +873,7 @@
             </a:ln>
             <a:extLst>
               <a:ext uri="{91240B29-F687-4f45-9708-019B960494DF}">
-                <a14:hiddenLine xmlns:a14="http://schemas.microsoft.com/office/drawing/2010/main" xmlns="" w="9525">
+                <a14:hiddenLine xmlns="" xmlns:a14="http://schemas.microsoft.com/office/drawing/2010/main" w="9525">
                   <a:solidFill>
                     <a:srgbClr val="000000"/>
                   </a:solidFill>
@@ -957,7 +963,7 @@
             </a:ln>
             <a:extLst>
               <a:ext uri="{91240B29-F687-4f45-9708-019B960494DF}">
-                <a14:hiddenLine xmlns:a14="http://schemas.microsoft.com/office/drawing/2010/main" xmlns="" w="9525">
+                <a14:hiddenLine xmlns="" xmlns:a14="http://schemas.microsoft.com/office/drawing/2010/main" w="9525">
                   <a:solidFill>
                     <a:srgbClr val="000000"/>
                   </a:solidFill>
@@ -1047,7 +1053,7 @@
             </a:ln>
             <a:extLst>
               <a:ext uri="{91240B29-F687-4f45-9708-019B960494DF}">
-                <a14:hiddenLine xmlns:a14="http://schemas.microsoft.com/office/drawing/2010/main" xmlns="" w="9525">
+                <a14:hiddenLine xmlns="" xmlns:a14="http://schemas.microsoft.com/office/drawing/2010/main" w="9525">
                   <a:solidFill>
                     <a:srgbClr val="000000"/>
                   </a:solidFill>
@@ -1109,7 +1115,7 @@
             </a:ln>
             <a:extLst>
               <a:ext uri="{91240B29-F687-4f45-9708-019B960494DF}">
-                <a14:hiddenLine xmlns:a14="http://schemas.microsoft.com/office/drawing/2010/main" xmlns="" w="9525">
+                <a14:hiddenLine xmlns="" xmlns:a14="http://schemas.microsoft.com/office/drawing/2010/main" w="9525">
                   <a:solidFill>
                     <a:srgbClr val="000000"/>
                   </a:solidFill>
@@ -1219,7 +1225,7 @@
             </a:ln>
             <a:extLst>
               <a:ext uri="{91240B29-F687-4f45-9708-019B960494DF}">
-                <a14:hiddenLine xmlns:a14="http://schemas.microsoft.com/office/drawing/2010/main" xmlns="" w="9525">
+                <a14:hiddenLine xmlns="" xmlns:a14="http://schemas.microsoft.com/office/drawing/2010/main" w="9525">
                   <a:solidFill>
                     <a:srgbClr val="000000"/>
                   </a:solidFill>
@@ -1281,7 +1287,7 @@
             </a:ln>
             <a:extLst>
               <a:ext uri="{91240B29-F687-4f45-9708-019B960494DF}">
-                <a14:hiddenLine xmlns:a14="http://schemas.microsoft.com/office/drawing/2010/main" xmlns="" w="9525">
+                <a14:hiddenLine xmlns="" xmlns:a14="http://schemas.microsoft.com/office/drawing/2010/main" w="9525">
                   <a:solidFill>
                     <a:srgbClr val="000000"/>
                   </a:solidFill>
@@ -1371,7 +1377,7 @@
             </a:ln>
             <a:extLst>
               <a:ext uri="{91240B29-F687-4f45-9708-019B960494DF}">
-                <a14:hiddenLine xmlns:a14="http://schemas.microsoft.com/office/drawing/2010/main" xmlns="" w="9525">
+                <a14:hiddenLine xmlns="" xmlns:a14="http://schemas.microsoft.com/office/drawing/2010/main" w="9525">
                   <a:solidFill>
                     <a:srgbClr val="000000"/>
                   </a:solidFill>
@@ -1461,7 +1467,7 @@
             </a:ln>
             <a:extLst>
               <a:ext uri="{91240B29-F687-4f45-9708-019B960494DF}">
-                <a14:hiddenLine xmlns:a14="http://schemas.microsoft.com/office/drawing/2010/main" xmlns="" w="9525">
+                <a14:hiddenLine xmlns="" xmlns:a14="http://schemas.microsoft.com/office/drawing/2010/main" w="9525">
                   <a:solidFill>
                     <a:srgbClr val="000000"/>
                   </a:solidFill>
@@ -1523,7 +1529,7 @@
             </a:ln>
             <a:extLst>
               <a:ext uri="{91240B29-F687-4f45-9708-019B960494DF}">
-                <a14:hiddenLine xmlns:a14="http://schemas.microsoft.com/office/drawing/2010/main" xmlns="" w="9525">
+                <a14:hiddenLine xmlns="" xmlns:a14="http://schemas.microsoft.com/office/drawing/2010/main" w="9525">
                   <a:solidFill>
                     <a:srgbClr val="000000"/>
                   </a:solidFill>
@@ -1613,7 +1619,7 @@
             </a:ln>
             <a:extLst>
               <a:ext uri="{91240B29-F687-4f45-9708-019B960494DF}">
-                <a14:hiddenLine xmlns:a14="http://schemas.microsoft.com/office/drawing/2010/main" xmlns="" w="9525">
+                <a14:hiddenLine xmlns="" xmlns:a14="http://schemas.microsoft.com/office/drawing/2010/main" w="9525">
                   <a:solidFill>
                     <a:srgbClr val="000000"/>
                   </a:solidFill>
@@ -1703,7 +1709,7 @@
             </a:ln>
             <a:extLst>
               <a:ext uri="{91240B29-F687-4f45-9708-019B960494DF}">
-                <a14:hiddenLine xmlns:a14="http://schemas.microsoft.com/office/drawing/2010/main" xmlns="" w="9525">
+                <a14:hiddenLine xmlns="" xmlns:a14="http://schemas.microsoft.com/office/drawing/2010/main" w="9525">
                   <a:solidFill>
                     <a:srgbClr val="000000"/>
                   </a:solidFill>
@@ -1759,7 +1765,7 @@
             </a:ln>
             <a:extLst>
               <a:ext uri="{91240B29-F687-4f45-9708-019B960494DF}">
-                <a14:hiddenLine xmlns:a14="http://schemas.microsoft.com/office/drawing/2010/main" xmlns="" w="9525">
+                <a14:hiddenLine xmlns="" xmlns:a14="http://schemas.microsoft.com/office/drawing/2010/main" w="9525">
                   <a:solidFill>
                     <a:srgbClr val="000000"/>
                   </a:solidFill>
@@ -1849,7 +1855,7 @@
             </a:ln>
             <a:extLst>
               <a:ext uri="{91240B29-F687-4f45-9708-019B960494DF}">
-                <a14:hiddenLine xmlns:a14="http://schemas.microsoft.com/office/drawing/2010/main" xmlns="" w="9525">
+                <a14:hiddenLine xmlns="" xmlns:a14="http://schemas.microsoft.com/office/drawing/2010/main" w="9525">
                   <a:solidFill>
                     <a:srgbClr val="000000"/>
                   </a:solidFill>
@@ -1905,7 +1911,7 @@
             </a:ln>
             <a:extLst>
               <a:ext uri="{91240B29-F687-4f45-9708-019B960494DF}">
-                <a14:hiddenLine xmlns:a14="http://schemas.microsoft.com/office/drawing/2010/main" xmlns="" w="9525">
+                <a14:hiddenLine xmlns="" xmlns:a14="http://schemas.microsoft.com/office/drawing/2010/main" w="9525">
                   <a:solidFill>
                     <a:srgbClr val="000000"/>
                   </a:solidFill>
@@ -1995,7 +2001,7 @@
             </a:ln>
             <a:extLst>
               <a:ext uri="{91240B29-F687-4f45-9708-019B960494DF}">
-                <a14:hiddenLine xmlns:a14="http://schemas.microsoft.com/office/drawing/2010/main" xmlns="" w="9525">
+                <a14:hiddenLine xmlns="" xmlns:a14="http://schemas.microsoft.com/office/drawing/2010/main" w="9525">
                   <a:solidFill>
                     <a:srgbClr val="000000"/>
                   </a:solidFill>
@@ -2063,7 +2069,7 @@
             </a:ln>
             <a:extLst>
               <a:ext uri="{91240B29-F687-4f45-9708-019B960494DF}">
-                <a14:hiddenLine xmlns:a14="http://schemas.microsoft.com/office/drawing/2010/main" xmlns="" w="9525">
+                <a14:hiddenLine xmlns="" xmlns:a14="http://schemas.microsoft.com/office/drawing/2010/main" w="9525">
                   <a:solidFill>
                     <a:srgbClr val="000000"/>
                   </a:solidFill>
@@ -2153,7 +2159,7 @@
             </a:ln>
             <a:extLst>
               <a:ext uri="{91240B29-F687-4f45-9708-019B960494DF}">
-                <a14:hiddenLine xmlns:a14="http://schemas.microsoft.com/office/drawing/2010/main" xmlns="" w="9525">
+                <a14:hiddenLine xmlns="" xmlns:a14="http://schemas.microsoft.com/office/drawing/2010/main" w="9525">
                   <a:solidFill>
                     <a:srgbClr val="000000"/>
                   </a:solidFill>
@@ -2221,7 +2227,7 @@
             </a:ln>
             <a:extLst>
               <a:ext uri="{91240B29-F687-4f45-9708-019B960494DF}">
-                <a14:hiddenLine xmlns:a14="http://schemas.microsoft.com/office/drawing/2010/main" xmlns="" w="9525">
+                <a14:hiddenLine xmlns="" xmlns:a14="http://schemas.microsoft.com/office/drawing/2010/main" w="9525">
                   <a:solidFill>
                     <a:srgbClr val="000000"/>
                   </a:solidFill>
@@ -2311,7 +2317,7 @@
             </a:ln>
             <a:extLst>
               <a:ext uri="{91240B29-F687-4f45-9708-019B960494DF}">
-                <a14:hiddenLine xmlns:a14="http://schemas.microsoft.com/office/drawing/2010/main" xmlns="" w="9525">
+                <a14:hiddenLine xmlns="" xmlns:a14="http://schemas.microsoft.com/office/drawing/2010/main" w="9525">
                   <a:solidFill>
                     <a:srgbClr val="000000"/>
                   </a:solidFill>
@@ -2345,7 +2351,7 @@
             </a:ln>
             <a:extLst>
               <a:ext uri="{91240B29-F687-4f45-9708-019B960494DF}">
-                <a14:hiddenLine xmlns:a14="http://schemas.microsoft.com/office/drawing/2010/main" xmlns="" w="9525">
+                <a14:hiddenLine xmlns="" xmlns:a14="http://schemas.microsoft.com/office/drawing/2010/main" w="9525">
                   <a:solidFill>
                     <a:srgbClr val="000000"/>
                   </a:solidFill>
@@ -2435,7 +2441,7 @@
             </a:ln>
             <a:extLst>
               <a:ext uri="{91240B29-F687-4f45-9708-019B960494DF}">
-                <a14:hiddenLine xmlns:a14="http://schemas.microsoft.com/office/drawing/2010/main" xmlns="" w="9525">
+                <a14:hiddenLine xmlns="" xmlns:a14="http://schemas.microsoft.com/office/drawing/2010/main" w="9525">
                   <a:solidFill>
                     <a:srgbClr val="000000"/>
                   </a:solidFill>
@@ -2497,7 +2503,7 @@
             </a:ln>
             <a:extLst>
               <a:ext uri="{91240B29-F687-4f45-9708-019B960494DF}">
-                <a14:hiddenLine xmlns:a14="http://schemas.microsoft.com/office/drawing/2010/main" xmlns="" w="9525">
+                <a14:hiddenLine xmlns="" xmlns:a14="http://schemas.microsoft.com/office/drawing/2010/main" w="9525">
                   <a:solidFill>
                     <a:srgbClr val="000000"/>
                   </a:solidFill>
@@ -2559,7 +2565,7 @@
             </a:ln>
             <a:extLst>
               <a:ext uri="{91240B29-F687-4f45-9708-019B960494DF}">
-                <a14:hiddenLine xmlns:a14="http://schemas.microsoft.com/office/drawing/2010/main" xmlns="" w="9525">
+                <a14:hiddenLine xmlns="" xmlns:a14="http://schemas.microsoft.com/office/drawing/2010/main" w="9525">
                   <a:solidFill>
                     <a:srgbClr val="000000"/>
                   </a:solidFill>
@@ -2649,7 +2655,7 @@
             </a:ln>
             <a:extLst>
               <a:ext uri="{91240B29-F687-4f45-9708-019B960494DF}">
-                <a14:hiddenLine xmlns:a14="http://schemas.microsoft.com/office/drawing/2010/main" xmlns="" w="9525">
+                <a14:hiddenLine xmlns="" xmlns:a14="http://schemas.microsoft.com/office/drawing/2010/main" w="9525">
                   <a:solidFill>
                     <a:srgbClr val="000000"/>
                   </a:solidFill>
@@ -2717,7 +2723,7 @@
             </a:ln>
             <a:extLst>
               <a:ext uri="{91240B29-F687-4f45-9708-019B960494DF}">
-                <a14:hiddenLine xmlns:a14="http://schemas.microsoft.com/office/drawing/2010/main" xmlns="" w="9525">
+                <a14:hiddenLine xmlns="" xmlns:a14="http://schemas.microsoft.com/office/drawing/2010/main" w="9525">
                   <a:solidFill>
                     <a:srgbClr val="000000"/>
                   </a:solidFill>
@@ -2779,7 +2785,7 @@
             </a:ln>
             <a:extLst>
               <a:ext uri="{91240B29-F687-4f45-9708-019B960494DF}">
-                <a14:hiddenLine xmlns:a14="http://schemas.microsoft.com/office/drawing/2010/main" xmlns="" w="9525">
+                <a14:hiddenLine xmlns="" xmlns:a14="http://schemas.microsoft.com/office/drawing/2010/main" w="9525">
                   <a:solidFill>
                     <a:srgbClr val="000000"/>
                   </a:solidFill>
@@ -2869,7 +2875,7 @@
             </a:ln>
             <a:extLst>
               <a:ext uri="{91240B29-F687-4f45-9708-019B960494DF}">
-                <a14:hiddenLine xmlns:a14="http://schemas.microsoft.com/office/drawing/2010/main" xmlns="" w="9525">
+                <a14:hiddenLine xmlns="" xmlns:a14="http://schemas.microsoft.com/office/drawing/2010/main" w="9525">
                   <a:solidFill>
                     <a:srgbClr val="000000"/>
                   </a:solidFill>
@@ -2931,7 +2937,7 @@
             </a:ln>
             <a:extLst>
               <a:ext uri="{91240B29-F687-4f45-9708-019B960494DF}">
-                <a14:hiddenLine xmlns:a14="http://schemas.microsoft.com/office/drawing/2010/main" xmlns="" w="9525">
+                <a14:hiddenLine xmlns="" xmlns:a14="http://schemas.microsoft.com/office/drawing/2010/main" w="9525">
                   <a:solidFill>
                     <a:srgbClr val="000000"/>
                   </a:solidFill>
@@ -3021,7 +3027,7 @@
             </a:ln>
             <a:extLst>
               <a:ext uri="{91240B29-F687-4f45-9708-019B960494DF}">
-                <a14:hiddenLine xmlns:a14="http://schemas.microsoft.com/office/drawing/2010/main" xmlns="" w="9525">
+                <a14:hiddenLine xmlns="" xmlns:a14="http://schemas.microsoft.com/office/drawing/2010/main" w="9525">
                   <a:solidFill>
                     <a:srgbClr val="000000"/>
                   </a:solidFill>
@@ -3083,7 +3089,7 @@
             </a:ln>
             <a:extLst>
               <a:ext uri="{91240B29-F687-4f45-9708-019B960494DF}">
-                <a14:hiddenLine xmlns:a14="http://schemas.microsoft.com/office/drawing/2010/main" xmlns="" w="9525">
+                <a14:hiddenLine xmlns="" xmlns:a14="http://schemas.microsoft.com/office/drawing/2010/main" w="9525">
                   <a:solidFill>
                     <a:srgbClr val="000000"/>
                   </a:solidFill>
@@ -3173,7 +3179,7 @@
             </a:ln>
             <a:extLst>
               <a:ext uri="{91240B29-F687-4f45-9708-019B960494DF}">
-                <a14:hiddenLine xmlns:a14="http://schemas.microsoft.com/office/drawing/2010/main" xmlns="" w="9525">
+                <a14:hiddenLine xmlns="" xmlns:a14="http://schemas.microsoft.com/office/drawing/2010/main" w="9525">
                   <a:solidFill>
                     <a:srgbClr val="000000"/>
                   </a:solidFill>
@@ -3207,7 +3213,7 @@
             </a:ln>
             <a:extLst>
               <a:ext uri="{91240B29-F687-4f45-9708-019B960494DF}">
-                <a14:hiddenLine xmlns:a14="http://schemas.microsoft.com/office/drawing/2010/main" xmlns="" w="9525">
+                <a14:hiddenLine xmlns="" xmlns:a14="http://schemas.microsoft.com/office/drawing/2010/main" w="9525">
                   <a:solidFill>
                     <a:srgbClr val="000000"/>
                   </a:solidFill>
@@ -3272,7 +3278,7 @@
             </a:ln>
             <a:extLst>
               <a:ext uri="{91240B29-F687-4f45-9708-019B960494DF}">
-                <a14:hiddenLine xmlns:a14="http://schemas.microsoft.com/office/drawing/2010/main" xmlns="" w="9525">
+                <a14:hiddenLine xmlns="" xmlns:a14="http://schemas.microsoft.com/office/drawing/2010/main" w="9525">
                   <a:solidFill>
                     <a:srgbClr val="000000"/>
                   </a:solidFill>
@@ -3362,7 +3368,7 @@
             </a:ln>
             <a:extLst>
               <a:ext uri="{91240B29-F687-4f45-9708-019B960494DF}">
-                <a14:hiddenLine xmlns:a14="http://schemas.microsoft.com/office/drawing/2010/main" xmlns="" w="9525">
+                <a14:hiddenLine xmlns="" xmlns:a14="http://schemas.microsoft.com/office/drawing/2010/main" w="9525">
                   <a:solidFill>
                     <a:srgbClr val="000000"/>
                   </a:solidFill>
@@ -3424,7 +3430,7 @@
             </a:ln>
             <a:extLst>
               <a:ext uri="{91240B29-F687-4f45-9708-019B960494DF}">
-                <a14:hiddenLine xmlns:a14="http://schemas.microsoft.com/office/drawing/2010/main" xmlns="" w="9525">
+                <a14:hiddenLine xmlns="" xmlns:a14="http://schemas.microsoft.com/office/drawing/2010/main" w="9525">
                   <a:solidFill>
                     <a:srgbClr val="000000"/>
                   </a:solidFill>
@@ -3514,7 +3520,7 @@
             </a:ln>
             <a:extLst>
               <a:ext uri="{91240B29-F687-4f45-9708-019B960494DF}">
-                <a14:hiddenLine xmlns:a14="http://schemas.microsoft.com/office/drawing/2010/main" xmlns="" w="9525">
+                <a14:hiddenLine xmlns="" xmlns:a14="http://schemas.microsoft.com/office/drawing/2010/main" w="9525">
                   <a:solidFill>
                     <a:srgbClr val="000000"/>
                   </a:solidFill>
@@ -3604,7 +3610,7 @@
             </a:ln>
             <a:extLst>
               <a:ext uri="{91240B29-F687-4f45-9708-019B960494DF}">
-                <a14:hiddenLine xmlns:a14="http://schemas.microsoft.com/office/drawing/2010/main" xmlns="" w="9525">
+                <a14:hiddenLine xmlns="" xmlns:a14="http://schemas.microsoft.com/office/drawing/2010/main" w="9525">
                   <a:solidFill>
                     <a:srgbClr val="000000"/>
                   </a:solidFill>
@@ -3669,7 +3675,7 @@
             </a:ln>
             <a:extLst>
               <a:ext uri="{91240B29-F687-4f45-9708-019B960494DF}">
-                <a14:hiddenLine xmlns:a14="http://schemas.microsoft.com/office/drawing/2010/main" xmlns="" w="9525">
+                <a14:hiddenLine xmlns="" xmlns:a14="http://schemas.microsoft.com/office/drawing/2010/main" w="9525">
                   <a:solidFill>
                     <a:srgbClr val="000000"/>
                   </a:solidFill>
@@ -3731,7 +3737,7 @@
             </a:ln>
             <a:extLst>
               <a:ext uri="{91240B29-F687-4f45-9708-019B960494DF}">
-                <a14:hiddenLine xmlns:a14="http://schemas.microsoft.com/office/drawing/2010/main" xmlns="" w="9525">
+                <a14:hiddenLine xmlns="" xmlns:a14="http://schemas.microsoft.com/office/drawing/2010/main" w="9525">
                   <a:solidFill>
                     <a:srgbClr val="000000"/>
                   </a:solidFill>
@@ -3821,7 +3827,7 @@
             </a:ln>
             <a:extLst>
               <a:ext uri="{91240B29-F687-4f45-9708-019B960494DF}">
-                <a14:hiddenLine xmlns:a14="http://schemas.microsoft.com/office/drawing/2010/main" xmlns="" w="9525">
+                <a14:hiddenLine xmlns="" xmlns:a14="http://schemas.microsoft.com/office/drawing/2010/main" w="9525">
                   <a:solidFill>
                     <a:srgbClr val="000000"/>
                   </a:solidFill>
@@ -3911,7 +3917,7 @@
             </a:ln>
             <a:extLst>
               <a:ext uri="{91240B29-F687-4f45-9708-019B960494DF}">
-                <a14:hiddenLine xmlns:a14="http://schemas.microsoft.com/office/drawing/2010/main" xmlns="" w="9525">
+                <a14:hiddenLine xmlns="" xmlns:a14="http://schemas.microsoft.com/office/drawing/2010/main" w="9525">
                   <a:solidFill>
                     <a:srgbClr val="000000"/>
                   </a:solidFill>
@@ -3973,7 +3979,7 @@
             </a:ln>
             <a:extLst>
               <a:ext uri="{91240B29-F687-4f45-9708-019B960494DF}">
-                <a14:hiddenLine xmlns:a14="http://schemas.microsoft.com/office/drawing/2010/main" xmlns="" w="9525">
+                <a14:hiddenLine xmlns="" xmlns:a14="http://schemas.microsoft.com/office/drawing/2010/main" w="9525">
                   <a:solidFill>
                     <a:srgbClr val="000000"/>
                   </a:solidFill>
@@ -4093,7 +4099,7 @@
             </a:ln>
             <a:extLst>
               <a:ext uri="{91240B29-F687-4f45-9708-019B960494DF}">
-                <a14:hiddenLine xmlns:a14="http://schemas.microsoft.com/office/drawing/2010/main" xmlns="" w="9525">
+                <a14:hiddenLine xmlns="" xmlns:a14="http://schemas.microsoft.com/office/drawing/2010/main" w="9525">
                   <a:solidFill>
                     <a:srgbClr val="000000"/>
                   </a:solidFill>
@@ -4161,7 +4167,7 @@
             </a:ln>
             <a:extLst>
               <a:ext uri="{91240B29-F687-4f45-9708-019B960494DF}">
-                <a14:hiddenLine xmlns:a14="http://schemas.microsoft.com/office/drawing/2010/main" xmlns="" w="9525">
+                <a14:hiddenLine xmlns="" xmlns:a14="http://schemas.microsoft.com/office/drawing/2010/main" w="9525">
                   <a:solidFill>
                     <a:srgbClr val="000000"/>
                   </a:solidFill>
@@ -4251,7 +4257,7 @@
             </a:ln>
             <a:extLst>
               <a:ext uri="{91240B29-F687-4f45-9708-019B960494DF}">
-                <a14:hiddenLine xmlns:a14="http://schemas.microsoft.com/office/drawing/2010/main" xmlns="" w="9525">
+                <a14:hiddenLine xmlns="" xmlns:a14="http://schemas.microsoft.com/office/drawing/2010/main" w="9525">
                   <a:solidFill>
                     <a:srgbClr val="000000"/>
                   </a:solidFill>
@@ -4391,7 +4397,7 @@
           <a:p>
             <a:fld id="{48A87A34-81AB-432B-8DAE-1953F412C126}" type="datetimeFigureOut">
               <a:rPr lang="en-US" dirty="0"/>
-              <a:t>2/4/2020</a:t>
+              <a:t>2/10/2020</a:t>
             </a:fld>
             <a:endParaRPr lang="en-US" dirty="0"/>
           </a:p>
@@ -4653,7 +4659,7 @@
           <a:p>
             <a:fld id="{48A87A34-81AB-432B-8DAE-1953F412C126}" type="datetimeFigureOut">
               <a:rPr lang="en-US" dirty="0"/>
-              <a:t>2/4/2020</a:t>
+              <a:t>2/10/2020</a:t>
             </a:fld>
             <a:endParaRPr lang="en-US" dirty="0"/>
           </a:p>
@@ -4844,7 +4850,7 @@
           <a:p>
             <a:fld id="{48A87A34-81AB-432B-8DAE-1953F412C126}" type="datetimeFigureOut">
               <a:rPr lang="en-US" dirty="0"/>
-              <a:t>2/4/2020</a:t>
+              <a:t>2/10/2020</a:t>
             </a:fld>
             <a:endParaRPr lang="en-US" dirty="0"/>
           </a:p>
@@ -5102,7 +5108,7 @@
           <a:p>
             <a:fld id="{48A87A34-81AB-432B-8DAE-1953F412C126}" type="datetimeFigureOut">
               <a:rPr lang="en-US" dirty="0"/>
-              <a:t>2/4/2020</a:t>
+              <a:t>2/10/2020</a:t>
             </a:fld>
             <a:endParaRPr lang="en-US" dirty="0"/>
           </a:p>
@@ -5531,7 +5537,7 @@
           <a:p>
             <a:fld id="{48A87A34-81AB-432B-8DAE-1953F412C126}" type="datetimeFigureOut">
               <a:rPr lang="en-US" dirty="0"/>
-              <a:t>2/4/2020</a:t>
+              <a:t>2/10/2020</a:t>
             </a:fld>
             <a:endParaRPr lang="en-US" dirty="0"/>
           </a:p>
@@ -6072,7 +6078,7 @@
           <a:p>
             <a:fld id="{48A87A34-81AB-432B-8DAE-1953F412C126}" type="datetimeFigureOut">
               <a:rPr lang="en-US" dirty="0"/>
-              <a:t>2/4/2020</a:t>
+              <a:t>2/10/2020</a:t>
             </a:fld>
             <a:endParaRPr lang="en-US" dirty="0"/>
           </a:p>
@@ -6787,7 +6793,7 @@
           <a:p>
             <a:fld id="{48A87A34-81AB-432B-8DAE-1953F412C126}" type="datetimeFigureOut">
               <a:rPr lang="en-US" dirty="0"/>
-              <a:t>2/4/2020</a:t>
+              <a:t>2/10/2020</a:t>
             </a:fld>
             <a:endParaRPr lang="en-US" dirty="0"/>
           </a:p>
@@ -6952,7 +6958,7 @@
           <a:p>
             <a:fld id="{48A87A34-81AB-432B-8DAE-1953F412C126}" type="datetimeFigureOut">
               <a:rPr lang="en-US" dirty="0"/>
-              <a:t>2/4/2020</a:t>
+              <a:t>2/10/2020</a:t>
             </a:fld>
             <a:endParaRPr lang="en-US" dirty="0"/>
           </a:p>
@@ -7127,7 +7133,7 @@
           <a:p>
             <a:fld id="{48A87A34-81AB-432B-8DAE-1953F412C126}" type="datetimeFigureOut">
               <a:rPr lang="en-US" dirty="0"/>
-              <a:t>2/4/2020</a:t>
+              <a:t>2/10/2020</a:t>
             </a:fld>
             <a:endParaRPr lang="en-US" dirty="0"/>
           </a:p>
@@ -7292,7 +7298,7 @@
           <a:p>
             <a:fld id="{48A87A34-81AB-432B-8DAE-1953F412C126}" type="datetimeFigureOut">
               <a:rPr lang="en-US" dirty="0"/>
-              <a:t>2/4/2020</a:t>
+              <a:t>2/10/2020</a:t>
             </a:fld>
             <a:endParaRPr lang="en-US" dirty="0"/>
           </a:p>
@@ -7537,7 +7543,7 @@
           <a:p>
             <a:fld id="{48A87A34-81AB-432B-8DAE-1953F412C126}" type="datetimeFigureOut">
               <a:rPr lang="en-US" dirty="0"/>
-              <a:t>2/4/2020</a:t>
+              <a:t>2/10/2020</a:t>
             </a:fld>
             <a:endParaRPr lang="en-US" dirty="0"/>
           </a:p>
@@ -7764,7 +7770,7 @@
           <a:p>
             <a:fld id="{48A87A34-81AB-432B-8DAE-1953F412C126}" type="datetimeFigureOut">
               <a:rPr lang="en-US" dirty="0"/>
-              <a:t>2/4/2020</a:t>
+              <a:t>2/10/2020</a:t>
             </a:fld>
             <a:endParaRPr lang="en-US" dirty="0"/>
           </a:p>
@@ -8140,7 +8146,7 @@
           <a:p>
             <a:fld id="{48A87A34-81AB-432B-8DAE-1953F412C126}" type="datetimeFigureOut">
               <a:rPr lang="en-US" dirty="0"/>
-              <a:t>2/4/2020</a:t>
+              <a:t>2/10/2020</a:t>
             </a:fld>
             <a:endParaRPr lang="en-US" dirty="0"/>
           </a:p>
@@ -8253,7 +8259,7 @@
           <a:p>
             <a:fld id="{48A87A34-81AB-432B-8DAE-1953F412C126}" type="datetimeFigureOut">
               <a:rPr lang="en-US" dirty="0"/>
-              <a:t>2/4/2020</a:t>
+              <a:t>2/10/2020</a:t>
             </a:fld>
             <a:endParaRPr lang="en-US" dirty="0"/>
           </a:p>
@@ -8343,7 +8349,7 @@
           <a:p>
             <a:fld id="{48A87A34-81AB-432B-8DAE-1953F412C126}" type="datetimeFigureOut">
               <a:rPr lang="en-US" dirty="0"/>
-              <a:t>2/4/2020</a:t>
+              <a:t>2/10/2020</a:t>
             </a:fld>
             <a:endParaRPr lang="en-US" dirty="0"/>
           </a:p>
@@ -8587,7 +8593,7 @@
           <a:p>
             <a:fld id="{48A87A34-81AB-432B-8DAE-1953F412C126}" type="datetimeFigureOut">
               <a:rPr lang="en-US" dirty="0"/>
-              <a:t>2/4/2020</a:t>
+              <a:t>2/10/2020</a:t>
             </a:fld>
             <a:endParaRPr lang="en-US" dirty="0"/>
           </a:p>
@@ -8862,7 +8868,7 @@
           <a:p>
             <a:fld id="{48A87A34-81AB-432B-8DAE-1953F412C126}" type="datetimeFigureOut">
               <a:rPr lang="en-US" dirty="0"/>
-              <a:t>2/4/2020</a:t>
+              <a:t>2/10/2020</a:t>
             </a:fld>
             <a:endParaRPr lang="en-US" dirty="0"/>
           </a:p>
@@ -8973,7 +8979,7 @@
           <a:noFill/>
           <a:extLst>
             <a:ext uri="{909E8E84-426E-40dd-AFC4-6F175D3DCCD1}">
-              <a14:hiddenFill xmlns:a14="http://schemas.microsoft.com/office/drawing/2010/main" xmlns="">
+              <a14:hiddenFill xmlns="" xmlns:a14="http://schemas.microsoft.com/office/drawing/2010/main">
                 <a:solidFill>
                   <a:srgbClr val="FFFFFF"/>
                 </a:solidFill>
@@ -9047,7 +9053,7 @@
               </a:ln>
               <a:extLst>
                 <a:ext uri="{91240B29-F687-4f45-9708-019B960494DF}">
-                  <a14:hiddenLine xmlns:a14="http://schemas.microsoft.com/office/drawing/2010/main" xmlns="" w="9525">
+                  <a14:hiddenLine xmlns="" xmlns:a14="http://schemas.microsoft.com/office/drawing/2010/main" w="9525">
                     <a:solidFill>
                       <a:srgbClr val="000000"/>
                     </a:solidFill>
@@ -9137,7 +9143,7 @@
               </a:ln>
               <a:extLst>
                 <a:ext uri="{91240B29-F687-4f45-9708-019B960494DF}">
-                  <a14:hiddenLine xmlns:a14="http://schemas.microsoft.com/office/drawing/2010/main" xmlns="" w="9525">
+                  <a14:hiddenLine xmlns="" xmlns:a14="http://schemas.microsoft.com/office/drawing/2010/main" w="9525">
                     <a:solidFill>
                       <a:srgbClr val="000000"/>
                     </a:solidFill>
@@ -9227,7 +9233,7 @@
               </a:ln>
               <a:extLst>
                 <a:ext uri="{91240B29-F687-4f45-9708-019B960494DF}">
-                  <a14:hiddenLine xmlns:a14="http://schemas.microsoft.com/office/drawing/2010/main" xmlns="" w="9525">
+                  <a14:hiddenLine xmlns="" xmlns:a14="http://schemas.microsoft.com/office/drawing/2010/main" w="9525">
                     <a:solidFill>
                       <a:srgbClr val="000000"/>
                     </a:solidFill>
@@ -9289,7 +9295,7 @@
               </a:ln>
               <a:extLst>
                 <a:ext uri="{91240B29-F687-4f45-9708-019B960494DF}">
-                  <a14:hiddenLine xmlns:a14="http://schemas.microsoft.com/office/drawing/2010/main" xmlns="" w="9525">
+                  <a14:hiddenLine xmlns="" xmlns:a14="http://schemas.microsoft.com/office/drawing/2010/main" w="9525">
                     <a:solidFill>
                       <a:srgbClr val="000000"/>
                     </a:solidFill>
@@ -9379,7 +9385,7 @@
               </a:ln>
               <a:extLst>
                 <a:ext uri="{91240B29-F687-4f45-9708-019B960494DF}">
-                  <a14:hiddenLine xmlns:a14="http://schemas.microsoft.com/office/drawing/2010/main" xmlns="" w="9525">
+                  <a14:hiddenLine xmlns="" xmlns:a14="http://schemas.microsoft.com/office/drawing/2010/main" w="9525">
                     <a:solidFill>
                       <a:srgbClr val="000000"/>
                     </a:solidFill>
@@ -9441,7 +9447,7 @@
               </a:ln>
               <a:extLst>
                 <a:ext uri="{91240B29-F687-4f45-9708-019B960494DF}">
-                  <a14:hiddenLine xmlns:a14="http://schemas.microsoft.com/office/drawing/2010/main" xmlns="" w="9525">
+                  <a14:hiddenLine xmlns="" xmlns:a14="http://schemas.microsoft.com/office/drawing/2010/main" w="9525">
                     <a:solidFill>
                       <a:srgbClr val="000000"/>
                     </a:solidFill>
@@ -9503,7 +9509,7 @@
               </a:ln>
               <a:extLst>
                 <a:ext uri="{91240B29-F687-4f45-9708-019B960494DF}">
-                  <a14:hiddenLine xmlns:a14="http://schemas.microsoft.com/office/drawing/2010/main" xmlns="" w="9525">
+                  <a14:hiddenLine xmlns="" xmlns:a14="http://schemas.microsoft.com/office/drawing/2010/main" w="9525">
                     <a:solidFill>
                       <a:srgbClr val="000000"/>
                     </a:solidFill>
@@ -9593,7 +9599,7 @@
               </a:ln>
               <a:extLst>
                 <a:ext uri="{91240B29-F687-4f45-9708-019B960494DF}">
-                  <a14:hiddenLine xmlns:a14="http://schemas.microsoft.com/office/drawing/2010/main" xmlns="" w="9525">
+                  <a14:hiddenLine xmlns="" xmlns:a14="http://schemas.microsoft.com/office/drawing/2010/main" w="9525">
                     <a:solidFill>
                       <a:srgbClr val="000000"/>
                     </a:solidFill>
@@ -9683,7 +9689,7 @@
               </a:ln>
               <a:extLst>
                 <a:ext uri="{91240B29-F687-4f45-9708-019B960494DF}">
-                  <a14:hiddenLine xmlns:a14="http://schemas.microsoft.com/office/drawing/2010/main" xmlns="" w="9525">
+                  <a14:hiddenLine xmlns="" xmlns:a14="http://schemas.microsoft.com/office/drawing/2010/main" w="9525">
                     <a:solidFill>
                       <a:srgbClr val="000000"/>
                     </a:solidFill>
@@ -9745,7 +9751,7 @@
               </a:ln>
               <a:extLst>
                 <a:ext uri="{91240B29-F687-4f45-9708-019B960494DF}">
-                  <a14:hiddenLine xmlns:a14="http://schemas.microsoft.com/office/drawing/2010/main" xmlns="" w="9525">
+                  <a14:hiddenLine xmlns="" xmlns:a14="http://schemas.microsoft.com/office/drawing/2010/main" w="9525">
                     <a:solidFill>
                       <a:srgbClr val="000000"/>
                     </a:solidFill>
@@ -9855,7 +9861,7 @@
               </a:ln>
               <a:extLst>
                 <a:ext uri="{91240B29-F687-4f45-9708-019B960494DF}">
-                  <a14:hiddenLine xmlns:a14="http://schemas.microsoft.com/office/drawing/2010/main" xmlns="" w="9525">
+                  <a14:hiddenLine xmlns="" xmlns:a14="http://schemas.microsoft.com/office/drawing/2010/main" w="9525">
                     <a:solidFill>
                       <a:srgbClr val="000000"/>
                     </a:solidFill>
@@ -9939,7 +9945,7 @@
               </a:ln>
               <a:extLst>
                 <a:ext uri="{91240B29-F687-4f45-9708-019B960494DF}">
-                  <a14:hiddenLine xmlns:a14="http://schemas.microsoft.com/office/drawing/2010/main" xmlns="" w="9525">
+                  <a14:hiddenLine xmlns="" xmlns:a14="http://schemas.microsoft.com/office/drawing/2010/main" w="9525">
                     <a:solidFill>
                       <a:srgbClr val="000000"/>
                     </a:solidFill>
@@ -10001,7 +10007,7 @@
               </a:ln>
               <a:extLst>
                 <a:ext uri="{91240B29-F687-4f45-9708-019B960494DF}">
-                  <a14:hiddenLine xmlns:a14="http://schemas.microsoft.com/office/drawing/2010/main" xmlns="" w="9525">
+                  <a14:hiddenLine xmlns="" xmlns:a14="http://schemas.microsoft.com/office/drawing/2010/main" w="9525">
                     <a:solidFill>
                       <a:srgbClr val="000000"/>
                     </a:solidFill>
@@ -10063,7 +10069,7 @@
               </a:ln>
               <a:extLst>
                 <a:ext uri="{91240B29-F687-4f45-9708-019B960494DF}">
-                  <a14:hiddenLine xmlns:a14="http://schemas.microsoft.com/office/drawing/2010/main" xmlns="" w="9525">
+                  <a14:hiddenLine xmlns="" xmlns:a14="http://schemas.microsoft.com/office/drawing/2010/main" w="9525">
                     <a:solidFill>
                       <a:srgbClr val="000000"/>
                     </a:solidFill>
@@ -10153,7 +10159,7 @@
               </a:ln>
               <a:extLst>
                 <a:ext uri="{91240B29-F687-4f45-9708-019B960494DF}">
-                  <a14:hiddenLine xmlns:a14="http://schemas.microsoft.com/office/drawing/2010/main" xmlns="" w="9525">
+                  <a14:hiddenLine xmlns="" xmlns:a14="http://schemas.microsoft.com/office/drawing/2010/main" w="9525">
                     <a:solidFill>
                       <a:srgbClr val="000000"/>
                     </a:solidFill>
@@ -10187,7 +10193,7 @@
               </a:ln>
               <a:extLst>
                 <a:ext uri="{91240B29-F687-4f45-9708-019B960494DF}">
-                  <a14:hiddenLine xmlns:a14="http://schemas.microsoft.com/office/drawing/2010/main" xmlns="" w="9525">
+                  <a14:hiddenLine xmlns="" xmlns:a14="http://schemas.microsoft.com/office/drawing/2010/main" w="9525">
                     <a:solidFill>
                       <a:srgbClr val="000000"/>
                     </a:solidFill>
@@ -10252,7 +10258,7 @@
               </a:ln>
               <a:extLst>
                 <a:ext uri="{91240B29-F687-4f45-9708-019B960494DF}">
-                  <a14:hiddenLine xmlns:a14="http://schemas.microsoft.com/office/drawing/2010/main" xmlns="" w="9525">
+                  <a14:hiddenLine xmlns="" xmlns:a14="http://schemas.microsoft.com/office/drawing/2010/main" w="9525">
                     <a:solidFill>
                       <a:srgbClr val="000000"/>
                     </a:solidFill>
@@ -10342,7 +10348,7 @@
               </a:ln>
               <a:extLst>
                 <a:ext uri="{91240B29-F687-4f45-9708-019B960494DF}">
-                  <a14:hiddenLine xmlns:a14="http://schemas.microsoft.com/office/drawing/2010/main" xmlns="" w="9525">
+                  <a14:hiddenLine xmlns="" xmlns:a14="http://schemas.microsoft.com/office/drawing/2010/main" w="9525">
                     <a:solidFill>
                       <a:srgbClr val="000000"/>
                     </a:solidFill>
@@ -10404,7 +10410,7 @@
               </a:ln>
               <a:extLst>
                 <a:ext uri="{91240B29-F687-4f45-9708-019B960494DF}">
-                  <a14:hiddenLine xmlns:a14="http://schemas.microsoft.com/office/drawing/2010/main" xmlns="" w="9525">
+                  <a14:hiddenLine xmlns="" xmlns:a14="http://schemas.microsoft.com/office/drawing/2010/main" w="9525">
                     <a:solidFill>
                       <a:srgbClr val="000000"/>
                     </a:solidFill>
@@ -10494,7 +10500,7 @@
               </a:ln>
               <a:extLst>
                 <a:ext uri="{91240B29-F687-4f45-9708-019B960494DF}">
-                  <a14:hiddenLine xmlns:a14="http://schemas.microsoft.com/office/drawing/2010/main" xmlns="" w="9525">
+                  <a14:hiddenLine xmlns="" xmlns:a14="http://schemas.microsoft.com/office/drawing/2010/main" w="9525">
                     <a:solidFill>
                       <a:srgbClr val="000000"/>
                     </a:solidFill>
@@ -10559,7 +10565,7 @@
               </a:ln>
               <a:extLst>
                 <a:ext uri="{91240B29-F687-4f45-9708-019B960494DF}">
-                  <a14:hiddenLine xmlns:a14="http://schemas.microsoft.com/office/drawing/2010/main" xmlns="" w="9525">
+                  <a14:hiddenLine xmlns="" xmlns:a14="http://schemas.microsoft.com/office/drawing/2010/main" w="9525">
                     <a:solidFill>
                       <a:srgbClr val="000000"/>
                     </a:solidFill>
@@ -10621,7 +10627,7 @@
               </a:ln>
               <a:extLst>
                 <a:ext uri="{91240B29-F687-4f45-9708-019B960494DF}">
-                  <a14:hiddenLine xmlns:a14="http://schemas.microsoft.com/office/drawing/2010/main" xmlns="" w="9525">
+                  <a14:hiddenLine xmlns="" xmlns:a14="http://schemas.microsoft.com/office/drawing/2010/main" w="9525">
                     <a:solidFill>
                       <a:srgbClr val="000000"/>
                     </a:solidFill>
@@ -10711,7 +10717,7 @@
               </a:ln>
               <a:extLst>
                 <a:ext uri="{91240B29-F687-4f45-9708-019B960494DF}">
-                  <a14:hiddenLine xmlns:a14="http://schemas.microsoft.com/office/drawing/2010/main" xmlns="" w="9525">
+                  <a14:hiddenLine xmlns="" xmlns:a14="http://schemas.microsoft.com/office/drawing/2010/main" w="9525">
                     <a:solidFill>
                       <a:srgbClr val="000000"/>
                     </a:solidFill>
@@ -10801,7 +10807,7 @@
               </a:ln>
               <a:extLst>
                 <a:ext uri="{91240B29-F687-4f45-9708-019B960494DF}">
-                  <a14:hiddenLine xmlns:a14="http://schemas.microsoft.com/office/drawing/2010/main" xmlns="" w="9525">
+                  <a14:hiddenLine xmlns="" xmlns:a14="http://schemas.microsoft.com/office/drawing/2010/main" w="9525">
                     <a:solidFill>
                       <a:srgbClr val="000000"/>
                     </a:solidFill>
@@ -10866,7 +10872,7 @@
               </a:ln>
               <a:extLst>
                 <a:ext uri="{91240B29-F687-4f45-9708-019B960494DF}">
-                  <a14:hiddenLine xmlns:a14="http://schemas.microsoft.com/office/drawing/2010/main" xmlns="" w="9525">
+                  <a14:hiddenLine xmlns="" xmlns:a14="http://schemas.microsoft.com/office/drawing/2010/main" w="9525">
                     <a:solidFill>
                       <a:srgbClr val="000000"/>
                     </a:solidFill>
@@ -10986,7 +10992,7 @@
               </a:ln>
               <a:extLst>
                 <a:ext uri="{91240B29-F687-4f45-9708-019B960494DF}">
-                  <a14:hiddenLine xmlns:a14="http://schemas.microsoft.com/office/drawing/2010/main" xmlns="" w="9525">
+                  <a14:hiddenLine xmlns="" xmlns:a14="http://schemas.microsoft.com/office/drawing/2010/main" w="9525">
                     <a:solidFill>
                       <a:srgbClr val="000000"/>
                     </a:solidFill>
@@ -11084,7 +11090,7 @@
               </a:ln>
               <a:extLst>
                 <a:ext uri="{91240B29-F687-4f45-9708-019B960494DF}">
-                  <a14:hiddenLine xmlns:a14="http://schemas.microsoft.com/office/drawing/2010/main" xmlns="" w="9525">
+                  <a14:hiddenLine xmlns="" xmlns:a14="http://schemas.microsoft.com/office/drawing/2010/main" w="9525">
                     <a:solidFill>
                       <a:srgbClr val="000000"/>
                     </a:solidFill>
@@ -11199,7 +11205,7 @@
               </a:ln>
               <a:extLst>
                 <a:ext uri="{91240B29-F687-4f45-9708-019B960494DF}">
-                  <a14:hiddenLine xmlns:a14="http://schemas.microsoft.com/office/drawing/2010/main" xmlns="" w="9525">
+                  <a14:hiddenLine xmlns="" xmlns:a14="http://schemas.microsoft.com/office/drawing/2010/main" w="9525">
                     <a:solidFill>
                       <a:srgbClr val="000000"/>
                     </a:solidFill>
@@ -11289,7 +11295,7 @@
               </a:ln>
               <a:extLst>
                 <a:ext uri="{91240B29-F687-4f45-9708-019B960494DF}">
-                  <a14:hiddenLine xmlns:a14="http://schemas.microsoft.com/office/drawing/2010/main" xmlns="" w="9525">
+                  <a14:hiddenLine xmlns="" xmlns:a14="http://schemas.microsoft.com/office/drawing/2010/main" w="9525">
                     <a:solidFill>
                       <a:srgbClr val="000000"/>
                     </a:solidFill>
@@ -11354,7 +11360,7 @@
               </a:ln>
               <a:extLst>
                 <a:ext uri="{91240B29-F687-4f45-9708-019B960494DF}">
-                  <a14:hiddenLine xmlns:a14="http://schemas.microsoft.com/office/drawing/2010/main" xmlns="" w="9525">
+                  <a14:hiddenLine xmlns="" xmlns:a14="http://schemas.microsoft.com/office/drawing/2010/main" w="9525">
                     <a:solidFill>
                       <a:srgbClr val="000000"/>
                     </a:solidFill>
@@ -11444,7 +11450,7 @@
               </a:ln>
               <a:extLst>
                 <a:ext uri="{91240B29-F687-4f45-9708-019B960494DF}">
-                  <a14:hiddenLine xmlns:a14="http://schemas.microsoft.com/office/drawing/2010/main" xmlns="" w="9525">
+                  <a14:hiddenLine xmlns="" xmlns:a14="http://schemas.microsoft.com/office/drawing/2010/main" w="9525">
                     <a:solidFill>
                       <a:srgbClr val="000000"/>
                     </a:solidFill>
@@ -11512,7 +11518,7 @@
               </a:ln>
               <a:extLst>
                 <a:ext uri="{91240B29-F687-4f45-9708-019B960494DF}">
-                  <a14:hiddenLine xmlns:a14="http://schemas.microsoft.com/office/drawing/2010/main" xmlns="" w="9525">
+                  <a14:hiddenLine xmlns="" xmlns:a14="http://schemas.microsoft.com/office/drawing/2010/main" w="9525">
                     <a:solidFill>
                       <a:srgbClr val="000000"/>
                     </a:solidFill>
@@ -11602,7 +11608,7 @@
               </a:ln>
               <a:extLst>
                 <a:ext uri="{91240B29-F687-4f45-9708-019B960494DF}">
-                  <a14:hiddenLine xmlns:a14="http://schemas.microsoft.com/office/drawing/2010/main" xmlns="" w="9525">
+                  <a14:hiddenLine xmlns="" xmlns:a14="http://schemas.microsoft.com/office/drawing/2010/main" w="9525">
                     <a:solidFill>
                       <a:srgbClr val="000000"/>
                     </a:solidFill>
@@ -11670,7 +11676,7 @@
               </a:ln>
               <a:extLst>
                 <a:ext uri="{91240B29-F687-4f45-9708-019B960494DF}">
-                  <a14:hiddenLine xmlns:a14="http://schemas.microsoft.com/office/drawing/2010/main" xmlns="" w="9525">
+                  <a14:hiddenLine xmlns="" xmlns:a14="http://schemas.microsoft.com/office/drawing/2010/main" w="9525">
                     <a:solidFill>
                       <a:srgbClr val="000000"/>
                     </a:solidFill>
@@ -11760,7 +11766,7 @@
               </a:ln>
               <a:extLst>
                 <a:ext uri="{91240B29-F687-4f45-9708-019B960494DF}">
-                  <a14:hiddenLine xmlns:a14="http://schemas.microsoft.com/office/drawing/2010/main" xmlns="" w="9525">
+                  <a14:hiddenLine xmlns="" xmlns:a14="http://schemas.microsoft.com/office/drawing/2010/main" w="9525">
                     <a:solidFill>
                       <a:srgbClr val="000000"/>
                     </a:solidFill>
@@ -11794,7 +11800,7 @@
               </a:ln>
               <a:extLst>
                 <a:ext uri="{91240B29-F687-4f45-9708-019B960494DF}">
-                  <a14:hiddenLine xmlns:a14="http://schemas.microsoft.com/office/drawing/2010/main" xmlns="" w="9525">
+                  <a14:hiddenLine xmlns="" xmlns:a14="http://schemas.microsoft.com/office/drawing/2010/main" w="9525">
                     <a:solidFill>
                       <a:srgbClr val="000000"/>
                     </a:solidFill>
@@ -11935,7 +11941,7 @@
             <a:fld id="{48A87A34-81AB-432B-8DAE-1953F412C126}" type="datetimeFigureOut">
               <a:rPr lang="en-US" dirty="0"/>
               <a:pPr/>
-              <a:t>2/4/2020</a:t>
+              <a:t>2/10/2020</a:t>
             </a:fld>
             <a:endParaRPr lang="en-US" dirty="0"/>
           </a:p>
@@ -12398,6 +12404,149 @@
 </p:sld>
 </file>
 
+<file path=ppt/slides/slide10.xml><?xml version="1.0" encoding="utf-8"?>
+<p:sld xmlns:a="http://schemas.openxmlformats.org/drawingml/2006/main" xmlns:r="http://schemas.openxmlformats.org/officeDocument/2006/relationships" xmlns:p="http://schemas.openxmlformats.org/presentationml/2006/main">
+  <p:cSld>
+    <p:spTree>
+      <p:nvGrpSpPr>
+        <p:cNvPr id="1" name=""/>
+        <p:cNvGrpSpPr/>
+        <p:nvPr/>
+      </p:nvGrpSpPr>
+      <p:grpSpPr>
+        <a:xfrm>
+          <a:off x="0" y="0"/>
+          <a:ext cx="0" cy="0"/>
+          <a:chOff x="0" y="0"/>
+          <a:chExt cx="0" cy="0"/>
+        </a:xfrm>
+      </p:grpSpPr>
+      <p:sp>
+        <p:nvSpPr>
+          <p:cNvPr id="2" name="Título 1"/>
+          <p:cNvSpPr>
+            <a:spLocks noGrp="1"/>
+          </p:cNvSpPr>
+          <p:nvPr>
+            <p:ph type="title"/>
+          </p:nvPr>
+        </p:nvSpPr>
+        <p:spPr/>
+        <p:txBody>
+          <a:bodyPr/>
+          <a:lstStyle/>
+          <a:p>
+            <a:r>
+              <a:rPr lang="es-ES" dirty="0" smtClean="0"/>
+              <a:t>Ejercicio de apropiación</a:t>
+            </a:r>
+            <a:endParaRPr lang="es-ES" dirty="0"/>
+          </a:p>
+        </p:txBody>
+      </p:sp>
+      <p:sp>
+        <p:nvSpPr>
+          <p:cNvPr id="3" name="Marcador de contenido 2"/>
+          <p:cNvSpPr>
+            <a:spLocks noGrp="1"/>
+          </p:cNvSpPr>
+          <p:nvPr>
+            <p:ph idx="1"/>
+          </p:nvPr>
+        </p:nvSpPr>
+        <p:spPr/>
+        <p:txBody>
+          <a:bodyPr>
+            <a:normAutofit/>
+          </a:bodyPr>
+          <a:lstStyle/>
+          <a:p>
+            <a:pPr marL="0" indent="0">
+              <a:buNone/>
+            </a:pPr>
+            <a:r>
+              <a:rPr lang="es-ES" dirty="0"/>
+              <a:t>Simulador Bancario: Se quiere crear un programa que </a:t>
+            </a:r>
+            <a:r>
+              <a:rPr lang="es-ES" dirty="0" smtClean="0"/>
+              <a:t>permite simular en un año el comportamiento de </a:t>
+            </a:r>
+            <a:r>
+              <a:rPr lang="es-ES" dirty="0"/>
+              <a:t>la cuenta bancaria de un cliente</a:t>
+            </a:r>
+            <a:r>
+              <a:rPr lang="es-ES" dirty="0" smtClean="0"/>
+              <a:t>. Las condiciones son:</a:t>
+            </a:r>
+            <a:endParaRPr lang="es-ES" dirty="0"/>
+          </a:p>
+          <a:p>
+            <a:r>
+              <a:rPr lang="es-ES" dirty="0" smtClean="0"/>
+              <a:t>Ejemplo</a:t>
+            </a:r>
+            <a:r>
+              <a:rPr lang="en-US" dirty="0" smtClean="0"/>
+              <a:t> </a:t>
+            </a:r>
+            <a:r>
+              <a:rPr lang="en-US" dirty="0"/>
+              <a:t>de </a:t>
+            </a:r>
+            <a:r>
+              <a:rPr lang="es-ES" dirty="0" smtClean="0"/>
+              <a:t>interfaz</a:t>
+            </a:r>
+            <a:r>
+              <a:rPr lang="en-US" dirty="0" smtClean="0"/>
+              <a:t>:</a:t>
+            </a:r>
+            <a:endParaRPr lang="en-US" dirty="0"/>
+          </a:p>
+          <a:p>
+            <a:endParaRPr lang="es-ES" dirty="0"/>
+          </a:p>
+        </p:txBody>
+      </p:sp>
+      <p:pic>
+        <p:nvPicPr>
+          <p:cNvPr id="4" name="Imagen 3"/>
+          <p:cNvPicPr>
+            <a:picLocks noChangeAspect="1"/>
+          </p:cNvPicPr>
+          <p:nvPr/>
+        </p:nvPicPr>
+        <p:blipFill>
+          <a:blip r:embed="rId2"/>
+          <a:stretch>
+            <a:fillRect/>
+          </a:stretch>
+        </p:blipFill>
+        <p:spPr>
+          <a:xfrm>
+            <a:off x="4230971" y="3454400"/>
+            <a:ext cx="3726880" cy="3135312"/>
+          </a:xfrm>
+          <a:prstGeom prst="rect">
+            <a:avLst/>
+          </a:prstGeom>
+        </p:spPr>
+      </p:pic>
+    </p:spTree>
+    <p:extLst>
+      <p:ext uri="{BB962C8B-B14F-4D97-AF65-F5344CB8AC3E}">
+        <p14:creationId xmlns:p14="http://schemas.microsoft.com/office/powerpoint/2010/main" val="1687118282"/>
+      </p:ext>
+    </p:extLst>
+  </p:cSld>
+  <p:clrMapOvr>
+    <a:masterClrMapping/>
+  </p:clrMapOvr>
+</p:sld>
+</file>
+
 <file path=ppt/slides/slide2.xml><?xml version="1.0" encoding="utf-8"?>
 <p:sld xmlns:a="http://schemas.openxmlformats.org/drawingml/2006/main" xmlns:r="http://schemas.openxmlformats.org/officeDocument/2006/relationships" xmlns:p="http://schemas.openxmlformats.org/presentationml/2006/main">
   <p:cSld>
@@ -13147,7 +13296,7 @@
           <a:p>
             <a:r>
               <a:rPr lang="es-ES" dirty="0" smtClean="0"/>
-              <a:t>Ejercicio de apropiación</a:t>
+              <a:t>Diseño de formulario plano</a:t>
             </a:r>
             <a:endParaRPr lang="es-ES" dirty="0"/>
           </a:p>
@@ -13160,66 +13309,151 @@
             <a:spLocks noGrp="1"/>
           </p:cNvSpPr>
           <p:nvPr>
-            <p:ph idx="1"/>
+            <p:ph sz="half" idx="1"/>
           </p:nvPr>
         </p:nvSpPr>
         <p:spPr/>
         <p:txBody>
           <a:bodyPr>
-            <a:normAutofit fontScale="92500"/>
+            <a:normAutofit fontScale="92500" lnSpcReduction="20000"/>
           </a:bodyPr>
           <a:lstStyle/>
           <a:p>
             <a:r>
               <a:rPr lang="es-ES" dirty="0" smtClean="0"/>
-              <a:t>Crear un aplicativo con un menú de opciones que permita en diferentes formularios:</a:t>
+              <a:t>Posicionar </a:t>
+            </a:r>
+            <a:r>
+              <a:rPr lang="es-ES" i="1" dirty="0" smtClean="0"/>
+              <a:t>Panel</a:t>
             </a:r>
           </a:p>
           <a:p>
             <a:pPr lvl="1"/>
             <a:r>
+              <a:rPr lang="es-ES" i="1" dirty="0" smtClean="0"/>
+              <a:t>Dock</a:t>
+            </a:r>
+          </a:p>
+          <a:p>
+            <a:pPr lvl="1"/>
+            <a:r>
+              <a:rPr lang="es-ES" i="1" dirty="0" err="1" smtClean="0"/>
+              <a:t>BackColor</a:t>
+            </a:r>
+            <a:endParaRPr lang="es-ES" i="1" dirty="0" smtClean="0"/>
+          </a:p>
+          <a:p>
+            <a:r>
               <a:rPr lang="es-ES" dirty="0" smtClean="0"/>
-              <a:t>Convertir </a:t>
-            </a:r>
-            <a:r>
-              <a:rPr lang="es-ES" dirty="0"/>
-              <a:t>de Litro a galón.</a:t>
+              <a:t>Para el formulario:</a:t>
             </a:r>
           </a:p>
           <a:p>
             <a:pPr lvl="1"/>
             <a:r>
-              <a:rPr lang="es-ES" dirty="0"/>
-              <a:t>Calcular y mostrar el índice de masa corporal de una persona con su respectiva clasificación.</a:t>
+              <a:rPr lang="es-ES" dirty="0" err="1" smtClean="0"/>
+              <a:t>FormBorderStyle</a:t>
+            </a:r>
+            <a:endParaRPr lang="es-ES" dirty="0" smtClean="0"/>
+          </a:p>
+          <a:p>
+            <a:r>
+              <a:rPr lang="es-ES" dirty="0" smtClean="0"/>
+              <a:t>Para botones:</a:t>
             </a:r>
           </a:p>
           <a:p>
             <a:pPr lvl="1"/>
             <a:r>
+              <a:rPr lang="es-ES" dirty="0" err="1" smtClean="0"/>
+              <a:t>FlatStyle</a:t>
+            </a:r>
+            <a:endParaRPr lang="es-ES" dirty="0" smtClean="0"/>
+          </a:p>
+          <a:p>
+            <a:pPr lvl="1"/>
+            <a:r>
+              <a:rPr lang="es-ES" dirty="0" err="1" smtClean="0"/>
+              <a:t>FlatAppearence</a:t>
+            </a:r>
+            <a:endParaRPr lang="es-ES" dirty="0" smtClean="0"/>
+          </a:p>
+          <a:p>
+            <a:pPr lvl="1"/>
+            <a:r>
+              <a:rPr lang="es-ES" dirty="0" err="1" smtClean="0"/>
+              <a:t>BackfroundImage</a:t>
+            </a:r>
+            <a:endParaRPr lang="es-ES" dirty="0" smtClean="0"/>
+          </a:p>
+          <a:p>
+            <a:endParaRPr lang="es-ES" dirty="0"/>
+          </a:p>
+        </p:txBody>
+      </p:sp>
+      <p:sp>
+        <p:nvSpPr>
+          <p:cNvPr id="4" name="Marcador de contenido 3"/>
+          <p:cNvSpPr>
+            <a:spLocks noGrp="1"/>
+          </p:cNvSpPr>
+          <p:nvPr>
+            <p:ph sz="half" idx="2"/>
+          </p:nvPr>
+        </p:nvSpPr>
+        <p:spPr/>
+        <p:txBody>
+          <a:bodyPr>
+            <a:normAutofit fontScale="92500" lnSpcReduction="20000"/>
+          </a:bodyPr>
+          <a:lstStyle/>
+          <a:p>
+            <a:r>
               <a:rPr lang="es-ES" dirty="0" smtClean="0"/>
-              <a:t>Mostrar cuanto </a:t>
-            </a:r>
-            <a:r>
-              <a:rPr lang="es-ES" dirty="0"/>
-              <a:t>necesita el estudiante en la nota final para aprobar el curso con la nota </a:t>
+              <a:t>Abrir formulario en panel</a:t>
+            </a:r>
+          </a:p>
+          <a:p>
+            <a:pPr lvl="1"/>
+            <a:r>
+              <a:rPr lang="es-ES" dirty="0" err="1" smtClean="0"/>
+              <a:t>FormX.TopLevel</a:t>
             </a:r>
             <a:r>
               <a:rPr lang="es-ES" dirty="0" smtClean="0"/>
-              <a:t>mínima dadas las siguientes condiciones: </a:t>
-            </a:r>
-          </a:p>
-          <a:p>
-            <a:pPr lvl="2"/>
+              <a:t>=false;</a:t>
+            </a:r>
+          </a:p>
+          <a:p>
+            <a:pPr lvl="1"/>
+            <a:r>
+              <a:rPr lang="es-ES" dirty="0" err="1" smtClean="0"/>
+              <a:t>This.panelX.Controls.Add</a:t>
+            </a:r>
             <a:r>
               <a:rPr lang="es-ES" dirty="0" smtClean="0"/>
-              <a:t>El estudiante </a:t>
-            </a:r>
-            <a:r>
-              <a:rPr lang="es-ES" dirty="0"/>
-              <a:t>realizará cuatro exámenes durante el semestre, los cuales tienen la siguiente ponderación: nota 1:20%, nota 2: 20 %, nota 3: 15% y nota 4: 45 %. El estudiante ya conoce las notas de los tres primeros exámenes. </a:t>
-            </a:r>
-          </a:p>
-          <a:p>
+              <a:t>(</a:t>
+            </a:r>
+            <a:r>
+              <a:rPr lang="es-ES" dirty="0" err="1" smtClean="0"/>
+              <a:t>FormX</a:t>
+            </a:r>
+            <a:r>
+              <a:rPr lang="es-ES" dirty="0" smtClean="0"/>
+              <a:t>);</a:t>
+            </a:r>
+          </a:p>
+          <a:p>
+            <a:pPr lvl="1"/>
+            <a:r>
+              <a:rPr lang="es-ES" dirty="0" err="1" smtClean="0"/>
+              <a:t>FormX.Show</a:t>
+            </a:r>
+            <a:r>
+              <a:rPr lang="es-ES" dirty="0" smtClean="0"/>
+              <a:t>();</a:t>
+            </a:r>
             <a:endParaRPr lang="es-ES" dirty="0"/>
           </a:p>
         </p:txBody>
@@ -13227,7 +13461,7 @@
     </p:spTree>
     <p:extLst>
       <p:ext uri="{BB962C8B-B14F-4D97-AF65-F5344CB8AC3E}">
-        <p14:creationId xmlns:p14="http://schemas.microsoft.com/office/powerpoint/2010/main" val="2754561322"/>
+        <p14:creationId xmlns:p14="http://schemas.microsoft.com/office/powerpoint/2010/main" val="498212108"/>
       </p:ext>
     </p:extLst>
   </p:cSld>
@@ -13287,79 +13521,60 @@
             <p:ph idx="1"/>
           </p:nvPr>
         </p:nvSpPr>
-        <p:spPr>
-          <a:xfrm>
-            <a:off x="1141412" y="2249486"/>
-            <a:ext cx="9905999" cy="4430713"/>
-          </a:xfrm>
-        </p:spPr>
+        <p:spPr/>
         <p:txBody>
           <a:bodyPr>
-            <a:normAutofit fontScale="55000" lnSpcReduction="20000"/>
+            <a:normAutofit fontScale="92500"/>
           </a:bodyPr>
           <a:lstStyle/>
           <a:p>
-            <a:pPr marL="0" indent="0">
-              <a:buNone/>
-            </a:pPr>
+            <a:r>
+              <a:rPr lang="es-ES" dirty="0" smtClean="0"/>
+              <a:t>Crear un aplicativo con un menú de opciones que permita en diferentes formularios:</a:t>
+            </a:r>
+          </a:p>
+          <a:p>
+            <a:pPr lvl="1"/>
+            <a:r>
+              <a:rPr lang="es-ES" dirty="0" smtClean="0"/>
+              <a:t>Convertir </a:t>
+            </a:r>
             <a:r>
               <a:rPr lang="es-ES" dirty="0"/>
-              <a:t>Simulador Bancario: Se quiere crear un programa que </a:t>
-            </a:r>
+              <a:t>de Litro a galón.</a:t>
+            </a:r>
+          </a:p>
+          <a:p>
+            <a:pPr lvl="1"/>
+            <a:r>
+              <a:rPr lang="es-ES" dirty="0"/>
+              <a:t>Calcular y mostrar el índice de masa corporal de una persona con su respectiva clasificación.</a:t>
+            </a:r>
+          </a:p>
+          <a:p>
+            <a:pPr lvl="1"/>
             <a:r>
               <a:rPr lang="es-ES" dirty="0" smtClean="0"/>
-              <a:t>permite simular en un año el comportamiento de </a:t>
+              <a:t>Mostrar cuanto </a:t>
             </a:r>
             <a:r>
               <a:rPr lang="es-ES" dirty="0"/>
-              <a:t>la cuenta bancaria de un cliente</a:t>
+              <a:t>necesita el estudiante en la nota final para aprobar el curso con la nota </a:t>
             </a:r>
             <a:r>
               <a:rPr lang="es-ES" dirty="0" smtClean="0"/>
-              <a:t>. Las condiciones son:</a:t>
-            </a:r>
-            <a:endParaRPr lang="es-ES" dirty="0"/>
-          </a:p>
-          <a:p>
+              <a:t>mínima dadas las siguientes condiciones: </a:t>
+            </a:r>
+          </a:p>
+          <a:p>
+            <a:pPr lvl="2"/>
+            <a:r>
+              <a:rPr lang="es-ES" dirty="0" smtClean="0"/>
+              <a:t>El estudiante </a:t>
+            </a:r>
             <a:r>
               <a:rPr lang="es-ES" dirty="0"/>
-              <a:t>Un cliente tiene un nombre y un número de cédula, el cual identifica la cuenta. Una cuenta, por su parte, está constituida por tres productos financieros básicos: (1) una cuenta de ahorros, (2) una cuenta corriente y (3) un certificado de depósito a término (CDT).</a:t>
-            </a:r>
-          </a:p>
-          <a:p>
-            <a:r>
-              <a:rPr lang="es-ES" dirty="0"/>
-              <a:t>Estos productos son independientes y tienen comportamientos particulares.</a:t>
-            </a:r>
-          </a:p>
-          <a:p>
-            <a:r>
-              <a:rPr lang="es-ES" dirty="0"/>
-              <a:t>El saldo total de la cuenta es la suma de lo que el cliente tiene en cada uno de dichos productos.</a:t>
-            </a:r>
-          </a:p>
-          <a:p>
-            <a:r>
-              <a:rPr lang="es-ES" dirty="0"/>
-              <a:t>En la cuenta corriente, el cliente puede depositar o retirar dinero. Su principal característica es que no recibe ningún interés por el dinero que se encuentre allí depositado.</a:t>
-            </a:r>
-          </a:p>
-          <a:p>
-            <a:r>
-              <a:rPr lang="es-ES" dirty="0"/>
-              <a:t>En la cuenta de ahorros, el cliente recibe un interés mensual del 0,6% sobre el saldo.</a:t>
-            </a:r>
-          </a:p>
-          <a:p>
-            <a:r>
-              <a:rPr lang="es-ES" dirty="0"/>
-              <a:t>Cuando el cliente abre un CDT, define la cantidad de dinero que quiere invertir y el banco asigna el interés mensual de 1.2%. A diferencia de la cuenta corriente o la cuenta de ahorros, en un CDT no se puede consignar ni retirar dinero. La única operación posible es cerrarlo, en cuyo caso, el dinero y sus intereses pasan a la cuenta corriente.</a:t>
-            </a:r>
-          </a:p>
-          <a:p>
-            <a:r>
-              <a:rPr lang="es-ES" dirty="0"/>
-              <a:t>Se quiere que el programa permita a una persona simular el manejo de sus productos bancarios, dándole las facilidades de: (1) hacer las operaciones necesarias sobre los productos que conforman la cuenta, y (2) avanzar mes por mes en el tiempo, para que el cliente pueda ver el resultado de sus movimientos bancarios y el rendimiento de sus inversiones.</a:t>
+              <a:t>realizará cuatro exámenes durante el semestre, los cuales tienen la siguiente ponderación: nota 1:20%, nota 2: 20 %, nota 3: 15% y nota 4: 45 %. El estudiante ya conoce las notas de los tres primeros exámenes. </a:t>
             </a:r>
           </a:p>
           <a:p>
@@ -13370,7 +13585,7 @@
     </p:spTree>
     <p:extLst>
       <p:ext uri="{BB962C8B-B14F-4D97-AF65-F5344CB8AC3E}">
-        <p14:creationId xmlns:p14="http://schemas.microsoft.com/office/powerpoint/2010/main" val="3345003008"/>
+        <p14:creationId xmlns:p14="http://schemas.microsoft.com/office/powerpoint/2010/main" val="2754561322"/>
       </p:ext>
     </p:extLst>
   </p:cSld>
@@ -13430,10 +13645,15 @@
             <p:ph idx="1"/>
           </p:nvPr>
         </p:nvSpPr>
-        <p:spPr/>
+        <p:spPr>
+          <a:xfrm>
+            <a:off x="1141412" y="2249486"/>
+            <a:ext cx="9905999" cy="4430713"/>
+          </a:xfrm>
+        </p:spPr>
         <p:txBody>
           <a:bodyPr>
-            <a:normAutofit/>
+            <a:normAutofit fontScale="55000" lnSpcReduction="20000"/>
           </a:bodyPr>
           <a:lstStyle/>
           <a:p>
@@ -13460,60 +13680,55 @@
           </a:p>
           <a:p>
             <a:r>
-              <a:rPr lang="es-ES" dirty="0" smtClean="0"/>
-              <a:t>Ejemplo</a:t>
-            </a:r>
-            <a:r>
-              <a:rPr lang="en-US" dirty="0" smtClean="0"/>
-              <a:t> </a:t>
-            </a:r>
-            <a:r>
-              <a:rPr lang="en-US" dirty="0"/>
-              <a:t>de </a:t>
-            </a:r>
-            <a:r>
-              <a:rPr lang="es-ES" dirty="0" smtClean="0"/>
-              <a:t>interfaz</a:t>
-            </a:r>
-            <a:r>
-              <a:rPr lang="en-US" dirty="0" smtClean="0"/>
-              <a:t>:</a:t>
-            </a:r>
-            <a:endParaRPr lang="en-US" dirty="0"/>
+              <a:rPr lang="es-ES" dirty="0"/>
+              <a:t>Un cliente tiene un nombre y un número de cédula, el cual identifica la cuenta. Una cuenta, por su parte, está constituida por tres productos financieros básicos: (1) una cuenta de ahorros, (2) una cuenta corriente y (3) un certificado de depósito a término (CDT).</a:t>
+            </a:r>
+          </a:p>
+          <a:p>
+            <a:r>
+              <a:rPr lang="es-ES" dirty="0"/>
+              <a:t>Estos productos son independientes y tienen comportamientos particulares.</a:t>
+            </a:r>
+          </a:p>
+          <a:p>
+            <a:r>
+              <a:rPr lang="es-ES" dirty="0"/>
+              <a:t>El saldo total de la cuenta es la suma de lo que el cliente tiene en cada uno de dichos productos.</a:t>
+            </a:r>
+          </a:p>
+          <a:p>
+            <a:r>
+              <a:rPr lang="es-ES" dirty="0"/>
+              <a:t>En la cuenta corriente, el cliente puede depositar o retirar dinero. Su principal característica es que no recibe ningún interés por el dinero que se encuentre allí depositado.</a:t>
+            </a:r>
+          </a:p>
+          <a:p>
+            <a:r>
+              <a:rPr lang="es-ES" dirty="0"/>
+              <a:t>En la cuenta de ahorros, el cliente recibe un interés mensual del 0,6% sobre el saldo.</a:t>
+            </a:r>
+          </a:p>
+          <a:p>
+            <a:r>
+              <a:rPr lang="es-ES" dirty="0"/>
+              <a:t>Cuando el cliente abre un CDT, define la cantidad de dinero que quiere invertir y el banco asigna el interés mensual de 1.2%. A diferencia de la cuenta corriente o la cuenta de ahorros, en un CDT no se puede consignar ni retirar dinero. La única operación posible es cerrarlo, en cuyo caso, el dinero y sus intereses pasan a la cuenta corriente.</a:t>
+            </a:r>
+          </a:p>
+          <a:p>
+            <a:r>
+              <a:rPr lang="es-ES" dirty="0"/>
+              <a:t>Se quiere que el programa permita a una persona simular el manejo de sus productos bancarios, dándole las facilidades de: (1) hacer las operaciones necesarias sobre los productos que conforman la cuenta, y (2) avanzar mes por mes en el tiempo, para que el cliente pueda ver el resultado de sus movimientos bancarios y el rendimiento de sus inversiones.</a:t>
+            </a:r>
           </a:p>
           <a:p>
             <a:endParaRPr lang="es-ES" dirty="0"/>
           </a:p>
         </p:txBody>
       </p:sp>
-      <p:pic>
-        <p:nvPicPr>
-          <p:cNvPr id="4" name="Imagen 3"/>
-          <p:cNvPicPr>
-            <a:picLocks noChangeAspect="1"/>
-          </p:cNvPicPr>
-          <p:nvPr/>
-        </p:nvPicPr>
-        <p:blipFill>
-          <a:blip r:embed="rId2"/>
-          <a:stretch>
-            <a:fillRect/>
-          </a:stretch>
-        </p:blipFill>
-        <p:spPr>
-          <a:xfrm>
-            <a:off x="4230971" y="3454400"/>
-            <a:ext cx="3726880" cy="3135312"/>
-          </a:xfrm>
-          <a:prstGeom prst="rect">
-            <a:avLst/>
-          </a:prstGeom>
-        </p:spPr>
-      </p:pic>
     </p:spTree>
     <p:extLst>
       <p:ext uri="{BB962C8B-B14F-4D97-AF65-F5344CB8AC3E}">
-        <p14:creationId xmlns:p14="http://schemas.microsoft.com/office/powerpoint/2010/main" val="1687118282"/>
+        <p14:creationId xmlns:p14="http://schemas.microsoft.com/office/powerpoint/2010/main" val="3345003008"/>
       </p:ext>
     </p:extLst>
   </p:cSld>

</xml_diff>